<commit_message>
Update 12.Second Law of Thermodynamics.pptx
</commit_message>
<xml_diff>
--- a/12.Second Law of Thermodynamics.pptx
+++ b/12.Second Law of Thermodynamics.pptx
@@ -21719,7 +21719,7 @@
               <a:rPr lang="en-US" dirty="0">
                 <a:hlinkClick r:id="rId3"/>
               </a:rPr>
-              <a:t>Example 1</a:t>
+              <a:t>Solution</a:t>
             </a:r>
             <a:endParaRPr sz="3200" b="1" i="0" u="none" strike="noStrike" cap="none" dirty="0">
               <a:solidFill>
@@ -21976,7 +21976,7 @@
               <a:rPr lang="en-US" dirty="0">
                 <a:hlinkClick r:id="rId3"/>
               </a:rPr>
-              <a:t>Example 2</a:t>
+              <a:t>Solution</a:t>
             </a:r>
             <a:endParaRPr sz="3200" b="1" i="0" u="none" strike="noStrike" cap="none" dirty="0">
               <a:solidFill>
@@ -22233,7 +22233,7 @@
               <a:rPr lang="en-US" dirty="0">
                 <a:hlinkClick r:id="rId3"/>
               </a:rPr>
-              <a:t>Example 3</a:t>
+              <a:t>Solution</a:t>
             </a:r>
             <a:endParaRPr sz="3200" b="1" i="0" u="none" strike="noStrike" cap="none" dirty="0">
               <a:solidFill>
@@ -25657,7 +25657,7 @@
               <a:rPr lang="en-US" dirty="0">
                 <a:hlinkClick r:id="rId4"/>
               </a:rPr>
-              <a:t>Example 4</a:t>
+              <a:t>Solution</a:t>
             </a:r>
             <a:endParaRPr sz="3200" b="1" i="0" u="none" strike="noStrike" cap="none" dirty="0">
               <a:solidFill>
@@ -27156,7 +27156,7 @@
               <a:rPr lang="en-US" dirty="0">
                 <a:hlinkClick r:id="rId4"/>
               </a:rPr>
-              <a:t>Example 5</a:t>
+              <a:t>Solution</a:t>
             </a:r>
             <a:endParaRPr sz="3200" b="1" i="0" u="none" strike="noStrike" cap="none" dirty="0">
               <a:solidFill>
@@ -27824,7 +27824,7 @@
               <a:rPr lang="en-US" dirty="0">
                 <a:hlinkClick r:id="rId4"/>
               </a:rPr>
-              <a:t>Example 6</a:t>
+              <a:t>Solution</a:t>
             </a:r>
             <a:endParaRPr sz="3200" b="1" i="0" u="none" strike="noStrike" cap="none" dirty="0">
               <a:solidFill>
@@ -28094,7 +28094,7 @@
               <a:rPr lang="en-US" dirty="0">
                 <a:hlinkClick r:id="rId3"/>
               </a:rPr>
-              <a:t>Example 7</a:t>
+              <a:t>Solution</a:t>
             </a:r>
             <a:endParaRPr sz="3200" b="1" i="0" u="none" strike="noStrike" cap="none" dirty="0">
               <a:solidFill>

</xml_diff>